<commit_message>
final final final -_-
</commit_message>
<xml_diff>
--- a/Connect Four APCS Presentation_Period 2_VishwaKode (1) (2).pptx
+++ b/Connect Four APCS Presentation_Period 2_VishwaKode (1) (2).pptx
@@ -1820,13 +1820,13 @@
     </dgm:pt>
   </dgm:ptLst>
   <dgm:cxnLst>
+    <dgm:cxn modelId="{35FB1EDE-2ED0-A84B-A6B2-8CBEB3BE5211}" srcId="{FF5B7031-021C-5149-9755-3C70EC673786}" destId="{08EEFF69-68A3-9443-8C9C-56F75592FEF5}" srcOrd="1" destOrd="0" parTransId="{BC4327AA-D985-A64B-901D-90688199C012}" sibTransId="{A89EEA80-F74D-4D4F-A806-85D5AE42C44F}"/>
     <dgm:cxn modelId="{C3BF2DF4-34DA-EF42-BFBC-29FB3633E51B}" type="presOf" srcId="{EE299811-8F7D-8F4C-B7AA-2F14DD264B5F}" destId="{9DBB2AFC-116E-FE47-BA2C-C2584987F39E}" srcOrd="0" destOrd="0" presId="urn:microsoft.com/office/officeart/2005/8/layout/default#2"/>
-    <dgm:cxn modelId="{35FB1EDE-2ED0-A84B-A6B2-8CBEB3BE5211}" srcId="{FF5B7031-021C-5149-9755-3C70EC673786}" destId="{08EEFF69-68A3-9443-8C9C-56F75592FEF5}" srcOrd="1" destOrd="0" parTransId="{BC4327AA-D985-A64B-901D-90688199C012}" sibTransId="{A89EEA80-F74D-4D4F-A806-85D5AE42C44F}"/>
+    <dgm:cxn modelId="{3328013A-1181-2D40-9B5E-B4C473C3B040}" type="presOf" srcId="{FF5B7031-021C-5149-9755-3C70EC673786}" destId="{3CE7F220-1610-2542-ABBA-40BE9E4B3093}" srcOrd="0" destOrd="0" presId="urn:microsoft.com/office/officeart/2005/8/layout/default#2"/>
+    <dgm:cxn modelId="{71D2BC91-B939-444A-B52D-197D7083087E}" type="presOf" srcId="{08EEFF69-68A3-9443-8C9C-56F75592FEF5}" destId="{FDCD724C-15AC-BE47-ADD9-C73205ECEA97}" srcOrd="0" destOrd="0" presId="urn:microsoft.com/office/officeart/2005/8/layout/default#2"/>
+    <dgm:cxn modelId="{CFF18E71-A5B6-8C44-8A9B-AD23D7D28B9D}" srcId="{FF5B7031-021C-5149-9755-3C70EC673786}" destId="{EE299811-8F7D-8F4C-B7AA-2F14DD264B5F}" srcOrd="0" destOrd="0" parTransId="{2F7602A2-2048-0046-B916-4F752F008AA8}" sibTransId="{B7E98D69-F4A3-9B47-BDBD-FE3094FE1BFC}"/>
+    <dgm:cxn modelId="{2BB28DEE-9723-6B4E-9ABC-6F8ED69228DE}" type="presOf" srcId="{CB0842CB-A422-E148-B433-5328192B2B4D}" destId="{D020A752-5EF6-6345-90B8-52E904334443}" srcOrd="0" destOrd="0" presId="urn:microsoft.com/office/officeart/2005/8/layout/default#2"/>
     <dgm:cxn modelId="{62783447-7394-6E49-A503-3CBF83064B46}" srcId="{FF5B7031-021C-5149-9755-3C70EC673786}" destId="{CB0842CB-A422-E148-B433-5328192B2B4D}" srcOrd="2" destOrd="0" parTransId="{EB353037-4731-1448-A3BE-96D93230892C}" sibTransId="{7033AD94-D751-BA40-A8F6-790E773A438D}"/>
-    <dgm:cxn modelId="{71D2BC91-B939-444A-B52D-197D7083087E}" type="presOf" srcId="{08EEFF69-68A3-9443-8C9C-56F75592FEF5}" destId="{FDCD724C-15AC-BE47-ADD9-C73205ECEA97}" srcOrd="0" destOrd="0" presId="urn:microsoft.com/office/officeart/2005/8/layout/default#2"/>
-    <dgm:cxn modelId="{3328013A-1181-2D40-9B5E-B4C473C3B040}" type="presOf" srcId="{FF5B7031-021C-5149-9755-3C70EC673786}" destId="{3CE7F220-1610-2542-ABBA-40BE9E4B3093}" srcOrd="0" destOrd="0" presId="urn:microsoft.com/office/officeart/2005/8/layout/default#2"/>
-    <dgm:cxn modelId="{2BB28DEE-9723-6B4E-9ABC-6F8ED69228DE}" type="presOf" srcId="{CB0842CB-A422-E148-B433-5328192B2B4D}" destId="{D020A752-5EF6-6345-90B8-52E904334443}" srcOrd="0" destOrd="0" presId="urn:microsoft.com/office/officeart/2005/8/layout/default#2"/>
-    <dgm:cxn modelId="{CFF18E71-A5B6-8C44-8A9B-AD23D7D28B9D}" srcId="{FF5B7031-021C-5149-9755-3C70EC673786}" destId="{EE299811-8F7D-8F4C-B7AA-2F14DD264B5F}" srcOrd="0" destOrd="0" parTransId="{2F7602A2-2048-0046-B916-4F752F008AA8}" sibTransId="{B7E98D69-F4A3-9B47-BDBD-FE3094FE1BFC}"/>
     <dgm:cxn modelId="{8E8452E2-B611-3241-A255-1FC48495134E}" type="presParOf" srcId="{3CE7F220-1610-2542-ABBA-40BE9E4B3093}" destId="{9DBB2AFC-116E-FE47-BA2C-C2584987F39E}" srcOrd="0" destOrd="0" presId="urn:microsoft.com/office/officeart/2005/8/layout/default#2"/>
     <dgm:cxn modelId="{DF1C8518-4111-4A4D-B445-BDCCFC55845B}" type="presParOf" srcId="{3CE7F220-1610-2542-ABBA-40BE9E4B3093}" destId="{D8EECE00-FCAF-C844-80D2-47333E4A37F7}" srcOrd="1" destOrd="0" presId="urn:microsoft.com/office/officeart/2005/8/layout/default#2"/>
     <dgm:cxn modelId="{366BE6BF-4088-5142-804B-5B8D09122BF9}" type="presParOf" srcId="{3CE7F220-1610-2542-ABBA-40BE9E4B3093}" destId="{FDCD724C-15AC-BE47-ADD9-C73205ECEA97}" srcOrd="2" destOrd="0" presId="urn:microsoft.com/office/officeart/2005/8/layout/default#2"/>
@@ -1837,7 +1837,7 @@
   <dgm:whole/>
   <dgm:extLst>
     <a:ext uri="http://schemas.microsoft.com/office/drawing/2008/diagram">
-      <dsp:dataModelExt xmlns:dsp="http://schemas.microsoft.com/office/drawing/2008/diagram" relId="rId6" minVer="http://schemas.openxmlformats.org/drawingml/2006/diagram"/>
+      <dsp:dataModelExt xmlns:dsp="http://schemas.microsoft.com/office/drawing/2008/diagram" xmlns="" relId="rId6" minVer="http://schemas.openxmlformats.org/drawingml/2006/diagram"/>
     </a:ext>
   </dgm:extLst>
 </dgm:dataModel>
@@ -2593,35 +2593,35 @@
     </dgm:pt>
   </dgm:ptLst>
   <dgm:cxnLst>
+    <dgm:cxn modelId="{40DD4DD6-8320-934B-98FF-313B061B7753}" srcId="{B014BFDF-B898-E74C-BDDF-3A757E178839}" destId="{FD3E40C3-BC09-2045-B7A4-EE455AA13DCA}" srcOrd="1" destOrd="0" parTransId="{C838E7A6-9607-9041-99D5-219A53FD39DD}" sibTransId="{92550E7A-C12B-9745-881C-68AD434853E3}"/>
+    <dgm:cxn modelId="{A13A6E3C-3D71-3C42-82EB-AF35E6822306}" srcId="{9D7DCE43-EDDA-6148-A162-EE2FC58CC58A}" destId="{42F7DB36-B5C7-D342-80B7-F0EE6CB0EDC1}" srcOrd="1" destOrd="0" parTransId="{F8A664BD-CA2B-5445-9AED-E95A4BC2A8C6}" sibTransId="{DF6A1490-6E12-EE49-92EA-F53E8A0E1DA1}"/>
     <dgm:cxn modelId="{2F9F4CCB-4C6D-994B-A6D0-4EEEFFD6A588}" type="presOf" srcId="{6FA956E9-620B-554C-A73E-05E44AF4450A}" destId="{A8155454-DD96-3D4A-A30E-D804C22A463A}" srcOrd="0" destOrd="1" presId="urn:microsoft.com/office/officeart/2005/8/layout/vList5"/>
+    <dgm:cxn modelId="{1A7432C1-D9ED-564F-ADA0-E4A4F7CD8CEF}" srcId="{9D7DCE43-EDDA-6148-A162-EE2FC58CC58A}" destId="{32A4A458-D07E-D249-993D-87EE8388CAEA}" srcOrd="2" destOrd="0" parTransId="{13F540C1-7091-A942-AB3F-4D83E71576B1}" sibTransId="{A3D4887A-D4E3-634E-AD34-5F7746C26772}"/>
+    <dgm:cxn modelId="{8798DE86-2E84-6846-88A1-B92099347D6B}" type="presOf" srcId="{B014BFDF-B898-E74C-BDDF-3A757E178839}" destId="{83F75F46-A7D6-D546-AEF0-D08F688BD658}" srcOrd="0" destOrd="0" presId="urn:microsoft.com/office/officeart/2005/8/layout/vList5"/>
+    <dgm:cxn modelId="{70716DD8-E04F-5344-B5C9-EA7666C2A3AE}" type="presOf" srcId="{76B0BF92-04FD-5B4D-B217-D9BA20105F0C}" destId="{BD278198-5D54-6E48-BE07-CCD6F3B407BE}" srcOrd="0" destOrd="1" presId="urn:microsoft.com/office/officeart/2005/8/layout/vList5"/>
+    <dgm:cxn modelId="{3D06537F-F6B9-904B-9B7A-BC59013492B2}" srcId="{B014BFDF-B898-E74C-BDDF-3A757E178839}" destId="{57E117C2-448E-EB4F-A9CC-99CBAEA313D0}" srcOrd="0" destOrd="0" parTransId="{4ED8E72B-78EC-434D-B0D4-5DB3DDD39957}" sibTransId="{455ECECB-2EED-7749-932B-38C11DBB169D}"/>
+    <dgm:cxn modelId="{AF3D58E9-9384-8F45-AAF8-3FD4FA6818F1}" type="presOf" srcId="{6054362E-677B-E244-AE1E-8FCDA278515D}" destId="{5E8E41D1-FD20-9C4D-BD1B-7FFE495DA9D0}" srcOrd="0" destOrd="0" presId="urn:microsoft.com/office/officeart/2005/8/layout/vList5"/>
+    <dgm:cxn modelId="{6F56AF3D-9403-AE4A-A467-4B432388C115}" type="presOf" srcId="{C9E2C9F7-D637-7D43-A338-AB8523C2ABE4}" destId="{3373B627-B53C-8C49-A234-488EBE331344}" srcOrd="0" destOrd="0" presId="urn:microsoft.com/office/officeart/2005/8/layout/vList5"/>
+    <dgm:cxn modelId="{F0E91E05-9354-B64C-BC08-057E72948F37}" type="presOf" srcId="{02D3605B-4336-C740-BD0B-ACE40574EFF6}" destId="{45DAC81C-2BFA-1448-BCEC-653F0960A040}" srcOrd="0" destOrd="0" presId="urn:microsoft.com/office/officeart/2005/8/layout/vList5"/>
+    <dgm:cxn modelId="{4F0698C2-4454-4943-A60C-7B891626CE1C}" srcId="{9D7DCE43-EDDA-6148-A162-EE2FC58CC58A}" destId="{C9E2C9F7-D637-7D43-A338-AB8523C2ABE4}" srcOrd="4" destOrd="0" parTransId="{0A67E595-81B8-A74F-8E4A-6A90309FDDFB}" sibTransId="{530766BF-8687-8145-A9CE-E3446B3CCF0D}"/>
+    <dgm:cxn modelId="{2CDF5E96-AB6C-0B44-85D9-FD500C0F6A3C}" srcId="{848E6ADA-5FC1-5747-989C-5D8C4B439FB9}" destId="{6FA956E9-620B-554C-A73E-05E44AF4450A}" srcOrd="1" destOrd="0" parTransId="{60EFD555-79C3-C54B-AFBC-54DEC30A1FC8}" sibTransId="{9E1EFED7-9F9F-A94C-9991-17935C703EFD}"/>
+    <dgm:cxn modelId="{846202EC-27E3-C249-960A-996FCCC7BF2C}" srcId="{9D7DCE43-EDDA-6148-A162-EE2FC58CC58A}" destId="{B014BFDF-B898-E74C-BDDF-3A757E178839}" srcOrd="0" destOrd="0" parTransId="{40A67B27-13F3-F447-ADB0-66A6594650E5}" sibTransId="{5E758614-8E9A-7D47-AED8-C738EAC0D416}"/>
+    <dgm:cxn modelId="{68334E59-EDF9-1B48-9DFC-2943AE67AD14}" srcId="{9D7DCE43-EDDA-6148-A162-EE2FC58CC58A}" destId="{848E6ADA-5FC1-5747-989C-5D8C4B439FB9}" srcOrd="3" destOrd="0" parTransId="{4D5CBA00-1DF3-B74F-9442-1BE0D8E0E5FC}" sibTransId="{FB92A09A-448F-BA48-8E24-DD2F450C1BD4}"/>
+    <dgm:cxn modelId="{95759128-FBC6-C641-AF57-8A34895A3DC3}" type="presOf" srcId="{848E6ADA-5FC1-5747-989C-5D8C4B439FB9}" destId="{5E1B08EB-5485-0144-963B-5DF980D5D82E}" srcOrd="0" destOrd="0" presId="urn:microsoft.com/office/officeart/2005/8/layout/vList5"/>
+    <dgm:cxn modelId="{D0123758-41B9-0B4B-8063-81BFA19E0AF5}" srcId="{32A4A458-D07E-D249-993D-87EE8388CAEA}" destId="{6054362E-677B-E244-AE1E-8FCDA278515D}" srcOrd="0" destOrd="0" parTransId="{CE33476C-FA69-FD4E-9728-761972617CFA}" sibTransId="{F0E40080-4A76-B549-A2F5-CF439E911ADB}"/>
+    <dgm:cxn modelId="{E4C3349E-7771-9842-AC07-EB260BF096B9}" type="presOf" srcId="{9D7DCE43-EDDA-6148-A162-EE2FC58CC58A}" destId="{F41CBD81-404C-E745-B41B-A008C7608218}" srcOrd="0" destOrd="0" presId="urn:microsoft.com/office/officeart/2005/8/layout/vList5"/>
+    <dgm:cxn modelId="{4F343CA8-9041-B14D-A187-DB70AE8F3A14}" srcId="{42F7DB36-B5C7-D342-80B7-F0EE6CB0EDC1}" destId="{27DEE510-AECB-8B42-9937-545E372E02B1}" srcOrd="1" destOrd="0" parTransId="{5EBC1D14-D9EA-1543-8E3C-DD1BCD20CDD9}" sibTransId="{2E8BC61F-C76D-6841-B7C8-3E164DCE3A1C}"/>
+    <dgm:cxn modelId="{04306314-3325-B741-BD46-1D59ABB5C2A7}" type="presOf" srcId="{57E117C2-448E-EB4F-A9CC-99CBAEA313D0}" destId="{856E0697-C7B8-4B4A-B394-5A2C3E2E558D}" srcOrd="0" destOrd="0" presId="urn:microsoft.com/office/officeart/2005/8/layout/vList5"/>
+    <dgm:cxn modelId="{A6B982E8-0EB3-7A4A-B36E-23E0BC9AF641}" srcId="{848E6ADA-5FC1-5747-989C-5D8C4B439FB9}" destId="{82A314DD-23B1-1042-B5AA-34D15FC5CF6E}" srcOrd="0" destOrd="0" parTransId="{D1545D87-FA9A-6540-A605-7C0D2A371495}" sibTransId="{F6C30B30-5F03-9043-8BC2-5398AE3B5A16}"/>
+    <dgm:cxn modelId="{B2B2FFAC-25AC-4F44-923B-F720C47BEBF6}" srcId="{C9E2C9F7-D637-7D43-A338-AB8523C2ABE4}" destId="{F5971FF0-97A9-4D4F-8D28-9A7E3B3FE761}" srcOrd="0" destOrd="0" parTransId="{5B1F28EC-E6F8-6349-90C4-F607121B2732}" sibTransId="{237A44B3-3469-394C-84E9-4E1DCA68EB39}"/>
+    <dgm:cxn modelId="{6EAB90C5-D256-7D4B-BF58-3C388C56E833}" type="presOf" srcId="{82A314DD-23B1-1042-B5AA-34D15FC5CF6E}" destId="{A8155454-DD96-3D4A-A30E-D804C22A463A}" srcOrd="0" destOrd="0" presId="urn:microsoft.com/office/officeart/2005/8/layout/vList5"/>
+    <dgm:cxn modelId="{98EDD387-2392-424E-B2ED-1AD5D1452FCB}" type="presOf" srcId="{32A4A458-D07E-D249-993D-87EE8388CAEA}" destId="{B72F2B7C-110C-D54A-875D-B3260D323E27}" srcOrd="0" destOrd="0" presId="urn:microsoft.com/office/officeart/2005/8/layout/vList5"/>
+    <dgm:cxn modelId="{95C05996-56C7-D04C-9B35-C4560BF3011A}" type="presOf" srcId="{27DEE510-AECB-8B42-9937-545E372E02B1}" destId="{45DAC81C-2BFA-1448-BCEC-653F0960A040}" srcOrd="0" destOrd="1" presId="urn:microsoft.com/office/officeart/2005/8/layout/vList5"/>
+    <dgm:cxn modelId="{09AE4F3D-04FA-4E40-AAF4-46398252B1CB}" type="presOf" srcId="{FD3E40C3-BC09-2045-B7A4-EE455AA13DCA}" destId="{856E0697-C7B8-4B4A-B394-5A2C3E2E558D}" srcOrd="0" destOrd="1" presId="urn:microsoft.com/office/officeart/2005/8/layout/vList5"/>
+    <dgm:cxn modelId="{B72F0870-E2AD-3241-BC8F-45BFCD3F0271}" type="presOf" srcId="{F5971FF0-97A9-4D4F-8D28-9A7E3B3FE761}" destId="{BD278198-5D54-6E48-BE07-CCD6F3B407BE}" srcOrd="0" destOrd="0" presId="urn:microsoft.com/office/officeart/2005/8/layout/vList5"/>
+    <dgm:cxn modelId="{CDF145E9-E82E-A042-A6B8-85CFF862F31C}" srcId="{42F7DB36-B5C7-D342-80B7-F0EE6CB0EDC1}" destId="{02D3605B-4336-C740-BD0B-ACE40574EFF6}" srcOrd="0" destOrd="0" parTransId="{9D38952B-8948-5647-8740-CF67EF41462F}" sibTransId="{2B37E6D1-F223-5641-AB02-12297D8D2F86}"/>
+    <dgm:cxn modelId="{55F2F47C-FE4B-4947-A3EF-2F56A24DA568}" srcId="{C9E2C9F7-D637-7D43-A338-AB8523C2ABE4}" destId="{76B0BF92-04FD-5B4D-B217-D9BA20105F0C}" srcOrd="1" destOrd="0" parTransId="{4F897AF1-CC2B-C841-A0BB-D99880F969F1}" sibTransId="{80301534-3414-7D48-9A7D-7D93CB03F95B}"/>
     <dgm:cxn modelId="{77329C58-F078-D644-807B-4B1402FCB2A1}" type="presOf" srcId="{42F7DB36-B5C7-D342-80B7-F0EE6CB0EDC1}" destId="{AB7F75BA-AB4C-8545-BF37-F3A2D50D5659}" srcOrd="0" destOrd="0" presId="urn:microsoft.com/office/officeart/2005/8/layout/vList5"/>
-    <dgm:cxn modelId="{8798DE86-2E84-6846-88A1-B92099347D6B}" type="presOf" srcId="{B014BFDF-B898-E74C-BDDF-3A757E178839}" destId="{83F75F46-A7D6-D546-AEF0-D08F688BD658}" srcOrd="0" destOrd="0" presId="urn:microsoft.com/office/officeart/2005/8/layout/vList5"/>
-    <dgm:cxn modelId="{95759128-FBC6-C641-AF57-8A34895A3DC3}" type="presOf" srcId="{848E6ADA-5FC1-5747-989C-5D8C4B439FB9}" destId="{5E1B08EB-5485-0144-963B-5DF980D5D82E}" srcOrd="0" destOrd="0" presId="urn:microsoft.com/office/officeart/2005/8/layout/vList5"/>
-    <dgm:cxn modelId="{6EAB90C5-D256-7D4B-BF58-3C388C56E833}" type="presOf" srcId="{82A314DD-23B1-1042-B5AA-34D15FC5CF6E}" destId="{A8155454-DD96-3D4A-A30E-D804C22A463A}" srcOrd="0" destOrd="0" presId="urn:microsoft.com/office/officeart/2005/8/layout/vList5"/>
-    <dgm:cxn modelId="{AF3D58E9-9384-8F45-AAF8-3FD4FA6818F1}" type="presOf" srcId="{6054362E-677B-E244-AE1E-8FCDA278515D}" destId="{5E8E41D1-FD20-9C4D-BD1B-7FFE495DA9D0}" srcOrd="0" destOrd="0" presId="urn:microsoft.com/office/officeart/2005/8/layout/vList5"/>
-    <dgm:cxn modelId="{1A7432C1-D9ED-564F-ADA0-E4A4F7CD8CEF}" srcId="{9D7DCE43-EDDA-6148-A162-EE2FC58CC58A}" destId="{32A4A458-D07E-D249-993D-87EE8388CAEA}" srcOrd="2" destOrd="0" parTransId="{13F540C1-7091-A942-AB3F-4D83E71576B1}" sibTransId="{A3D4887A-D4E3-634E-AD34-5F7746C26772}"/>
-    <dgm:cxn modelId="{F0E91E05-9354-B64C-BC08-057E72948F37}" type="presOf" srcId="{02D3605B-4336-C740-BD0B-ACE40574EFF6}" destId="{45DAC81C-2BFA-1448-BCEC-653F0960A040}" srcOrd="0" destOrd="0" presId="urn:microsoft.com/office/officeart/2005/8/layout/vList5"/>
-    <dgm:cxn modelId="{3D06537F-F6B9-904B-9B7A-BC59013492B2}" srcId="{B014BFDF-B898-E74C-BDDF-3A757E178839}" destId="{57E117C2-448E-EB4F-A9CC-99CBAEA313D0}" srcOrd="0" destOrd="0" parTransId="{4ED8E72B-78EC-434D-B0D4-5DB3DDD39957}" sibTransId="{455ECECB-2EED-7749-932B-38C11DBB169D}"/>
-    <dgm:cxn modelId="{6F56AF3D-9403-AE4A-A467-4B432388C115}" type="presOf" srcId="{C9E2C9F7-D637-7D43-A338-AB8523C2ABE4}" destId="{3373B627-B53C-8C49-A234-488EBE331344}" srcOrd="0" destOrd="0" presId="urn:microsoft.com/office/officeart/2005/8/layout/vList5"/>
-    <dgm:cxn modelId="{55F2F47C-FE4B-4947-A3EF-2F56A24DA568}" srcId="{C9E2C9F7-D637-7D43-A338-AB8523C2ABE4}" destId="{76B0BF92-04FD-5B4D-B217-D9BA20105F0C}" srcOrd="1" destOrd="0" parTransId="{4F897AF1-CC2B-C841-A0BB-D99880F969F1}" sibTransId="{80301534-3414-7D48-9A7D-7D93CB03F95B}"/>
-    <dgm:cxn modelId="{E4C3349E-7771-9842-AC07-EB260BF096B9}" type="presOf" srcId="{9D7DCE43-EDDA-6148-A162-EE2FC58CC58A}" destId="{F41CBD81-404C-E745-B41B-A008C7608218}" srcOrd="0" destOrd="0" presId="urn:microsoft.com/office/officeart/2005/8/layout/vList5"/>
-    <dgm:cxn modelId="{D0123758-41B9-0B4B-8063-81BFA19E0AF5}" srcId="{32A4A458-D07E-D249-993D-87EE8388CAEA}" destId="{6054362E-677B-E244-AE1E-8FCDA278515D}" srcOrd="0" destOrd="0" parTransId="{CE33476C-FA69-FD4E-9728-761972617CFA}" sibTransId="{F0E40080-4A76-B549-A2F5-CF439E911ADB}"/>
-    <dgm:cxn modelId="{40DD4DD6-8320-934B-98FF-313B061B7753}" srcId="{B014BFDF-B898-E74C-BDDF-3A757E178839}" destId="{FD3E40C3-BC09-2045-B7A4-EE455AA13DCA}" srcOrd="1" destOrd="0" parTransId="{C838E7A6-9607-9041-99D5-219A53FD39DD}" sibTransId="{92550E7A-C12B-9745-881C-68AD434853E3}"/>
-    <dgm:cxn modelId="{70716DD8-E04F-5344-B5C9-EA7666C2A3AE}" type="presOf" srcId="{76B0BF92-04FD-5B4D-B217-D9BA20105F0C}" destId="{BD278198-5D54-6E48-BE07-CCD6F3B407BE}" srcOrd="0" destOrd="1" presId="urn:microsoft.com/office/officeart/2005/8/layout/vList5"/>
-    <dgm:cxn modelId="{09AE4F3D-04FA-4E40-AAF4-46398252B1CB}" type="presOf" srcId="{FD3E40C3-BC09-2045-B7A4-EE455AA13DCA}" destId="{856E0697-C7B8-4B4A-B394-5A2C3E2E558D}" srcOrd="0" destOrd="1" presId="urn:microsoft.com/office/officeart/2005/8/layout/vList5"/>
-    <dgm:cxn modelId="{2CDF5E96-AB6C-0B44-85D9-FD500C0F6A3C}" srcId="{848E6ADA-5FC1-5747-989C-5D8C4B439FB9}" destId="{6FA956E9-620B-554C-A73E-05E44AF4450A}" srcOrd="1" destOrd="0" parTransId="{60EFD555-79C3-C54B-AFBC-54DEC30A1FC8}" sibTransId="{9E1EFED7-9F9F-A94C-9991-17935C703EFD}"/>
-    <dgm:cxn modelId="{A6B982E8-0EB3-7A4A-B36E-23E0BC9AF641}" srcId="{848E6ADA-5FC1-5747-989C-5D8C4B439FB9}" destId="{82A314DD-23B1-1042-B5AA-34D15FC5CF6E}" srcOrd="0" destOrd="0" parTransId="{D1545D87-FA9A-6540-A605-7C0D2A371495}" sibTransId="{F6C30B30-5F03-9043-8BC2-5398AE3B5A16}"/>
-    <dgm:cxn modelId="{4F343CA8-9041-B14D-A187-DB70AE8F3A14}" srcId="{42F7DB36-B5C7-D342-80B7-F0EE6CB0EDC1}" destId="{27DEE510-AECB-8B42-9937-545E372E02B1}" srcOrd="1" destOrd="0" parTransId="{5EBC1D14-D9EA-1543-8E3C-DD1BCD20CDD9}" sibTransId="{2E8BC61F-C76D-6841-B7C8-3E164DCE3A1C}"/>
-    <dgm:cxn modelId="{A13A6E3C-3D71-3C42-82EB-AF35E6822306}" srcId="{9D7DCE43-EDDA-6148-A162-EE2FC58CC58A}" destId="{42F7DB36-B5C7-D342-80B7-F0EE6CB0EDC1}" srcOrd="1" destOrd="0" parTransId="{F8A664BD-CA2B-5445-9AED-E95A4BC2A8C6}" sibTransId="{DF6A1490-6E12-EE49-92EA-F53E8A0E1DA1}"/>
-    <dgm:cxn modelId="{846202EC-27E3-C249-960A-996FCCC7BF2C}" srcId="{9D7DCE43-EDDA-6148-A162-EE2FC58CC58A}" destId="{B014BFDF-B898-E74C-BDDF-3A757E178839}" srcOrd="0" destOrd="0" parTransId="{40A67B27-13F3-F447-ADB0-66A6594650E5}" sibTransId="{5E758614-8E9A-7D47-AED8-C738EAC0D416}"/>
-    <dgm:cxn modelId="{04306314-3325-B741-BD46-1D59ABB5C2A7}" type="presOf" srcId="{57E117C2-448E-EB4F-A9CC-99CBAEA313D0}" destId="{856E0697-C7B8-4B4A-B394-5A2C3E2E558D}" srcOrd="0" destOrd="0" presId="urn:microsoft.com/office/officeart/2005/8/layout/vList5"/>
-    <dgm:cxn modelId="{4F0698C2-4454-4943-A60C-7B891626CE1C}" srcId="{9D7DCE43-EDDA-6148-A162-EE2FC58CC58A}" destId="{C9E2C9F7-D637-7D43-A338-AB8523C2ABE4}" srcOrd="4" destOrd="0" parTransId="{0A67E595-81B8-A74F-8E4A-6A90309FDDFB}" sibTransId="{530766BF-8687-8145-A9CE-E3446B3CCF0D}"/>
-    <dgm:cxn modelId="{68334E59-EDF9-1B48-9DFC-2943AE67AD14}" srcId="{9D7DCE43-EDDA-6148-A162-EE2FC58CC58A}" destId="{848E6ADA-5FC1-5747-989C-5D8C4B439FB9}" srcOrd="3" destOrd="0" parTransId="{4D5CBA00-1DF3-B74F-9442-1BE0D8E0E5FC}" sibTransId="{FB92A09A-448F-BA48-8E24-DD2F450C1BD4}"/>
-    <dgm:cxn modelId="{CDF145E9-E82E-A042-A6B8-85CFF862F31C}" srcId="{42F7DB36-B5C7-D342-80B7-F0EE6CB0EDC1}" destId="{02D3605B-4336-C740-BD0B-ACE40574EFF6}" srcOrd="0" destOrd="0" parTransId="{9D38952B-8948-5647-8740-CF67EF41462F}" sibTransId="{2B37E6D1-F223-5641-AB02-12297D8D2F86}"/>
-    <dgm:cxn modelId="{B2B2FFAC-25AC-4F44-923B-F720C47BEBF6}" srcId="{C9E2C9F7-D637-7D43-A338-AB8523C2ABE4}" destId="{F5971FF0-97A9-4D4F-8D28-9A7E3B3FE761}" srcOrd="0" destOrd="0" parTransId="{5B1F28EC-E6F8-6349-90C4-F607121B2732}" sibTransId="{237A44B3-3469-394C-84E9-4E1DCA68EB39}"/>
-    <dgm:cxn modelId="{95C05996-56C7-D04C-9B35-C4560BF3011A}" type="presOf" srcId="{27DEE510-AECB-8B42-9937-545E372E02B1}" destId="{45DAC81C-2BFA-1448-BCEC-653F0960A040}" srcOrd="0" destOrd="1" presId="urn:microsoft.com/office/officeart/2005/8/layout/vList5"/>
-    <dgm:cxn modelId="{98EDD387-2392-424E-B2ED-1AD5D1452FCB}" type="presOf" srcId="{32A4A458-D07E-D249-993D-87EE8388CAEA}" destId="{B72F2B7C-110C-D54A-875D-B3260D323E27}" srcOrd="0" destOrd="0" presId="urn:microsoft.com/office/officeart/2005/8/layout/vList5"/>
-    <dgm:cxn modelId="{B72F0870-E2AD-3241-BC8F-45BFCD3F0271}" type="presOf" srcId="{F5971FF0-97A9-4D4F-8D28-9A7E3B3FE761}" destId="{BD278198-5D54-6E48-BE07-CCD6F3B407BE}" srcOrd="0" destOrd="0" presId="urn:microsoft.com/office/officeart/2005/8/layout/vList5"/>
     <dgm:cxn modelId="{8B3967E3-86AB-4A42-8061-09BED5DDCEFF}" type="presParOf" srcId="{F41CBD81-404C-E745-B41B-A008C7608218}" destId="{0846757D-7667-5F4D-A485-5B8B4AD5951E}" srcOrd="0" destOrd="0" presId="urn:microsoft.com/office/officeart/2005/8/layout/vList5"/>
     <dgm:cxn modelId="{F2785A70-8800-E240-A473-06A2E3D0C3E1}" type="presParOf" srcId="{0846757D-7667-5F4D-A485-5B8B4AD5951E}" destId="{83F75F46-A7D6-D546-AEF0-D08F688BD658}" srcOrd="0" destOrd="0" presId="urn:microsoft.com/office/officeart/2005/8/layout/vList5"/>
     <dgm:cxn modelId="{E816C694-FA55-8B4B-93AD-3F398F2E5F4F}" type="presParOf" srcId="{0846757D-7667-5F4D-A485-5B8B4AD5951E}" destId="{856E0697-C7B8-4B4A-B394-5A2C3E2E558D}" srcOrd="1" destOrd="0" presId="urn:microsoft.com/office/officeart/2005/8/layout/vList5"/>
@@ -2646,14 +2646,14 @@
   <dgm:whole/>
   <dgm:extLst>
     <a:ext uri="http://schemas.microsoft.com/office/drawing/2008/diagram">
-      <dsp:dataModelExt xmlns:dsp="http://schemas.microsoft.com/office/drawing/2008/diagram" relId="rId6" minVer="http://schemas.openxmlformats.org/drawingml/2006/diagram"/>
+      <dsp:dataModelExt xmlns:dsp="http://schemas.microsoft.com/office/drawing/2008/diagram" xmlns="" relId="rId6" minVer="http://schemas.openxmlformats.org/drawingml/2006/diagram"/>
     </a:ext>
   </dgm:extLst>
 </dgm:dataModel>
 </file>
 
 <file path=ppt/diagrams/drawing1.xml><?xml version="1.0" encoding="utf-8"?>
-<dsp:drawing xmlns:dgm="http://schemas.openxmlformats.org/drawingml/2006/diagram" xmlns:dsp="http://schemas.microsoft.com/office/drawing/2008/diagram" xmlns:a="http://schemas.openxmlformats.org/drawingml/2006/main">
+<dsp:drawing xmlns:dgm="http://schemas.openxmlformats.org/drawingml/2006/diagram" xmlns:a="http://schemas.openxmlformats.org/drawingml/2006/main" xmlns:dsp="http://schemas.microsoft.com/office/drawing/2008/diagram">
   <dsp:spTree>
     <dsp:nvGrpSpPr>
       <dsp:cNvPr id="0" name=""/>
@@ -2938,7 +2938,7 @@
 </file>
 
 <file path=ppt/diagrams/drawing2.xml><?xml version="1.0" encoding="utf-8"?>
-<dsp:drawing xmlns:dgm="http://schemas.openxmlformats.org/drawingml/2006/diagram" xmlns:dsp="http://schemas.microsoft.com/office/drawing/2008/diagram" xmlns:a="http://schemas.openxmlformats.org/drawingml/2006/main">
+<dsp:drawing xmlns:dgm="http://schemas.openxmlformats.org/drawingml/2006/diagram" xmlns:a="http://schemas.openxmlformats.org/drawingml/2006/main" xmlns:dsp="http://schemas.microsoft.com/office/drawing/2008/diagram">
   <dsp:spTree>
     <dsp:nvGrpSpPr>
       <dsp:cNvPr id="0" name=""/>
@@ -3039,9 +3039,9 @@
           <a:endParaRPr lang="en-US" sz="1800" kern="1200" dirty="0"/>
         </a:p>
       </dsp:txBody>
-      <dsp:txXfrm rot="-5400000">
-        <a:off x="3289870" y="152244"/>
-        <a:ext cx="5806590" cy="777589"/>
+      <dsp:txXfrm rot="5400000">
+        <a:off x="5783337" y="-2383289"/>
+        <a:ext cx="861721" cy="5848656"/>
       </dsp:txXfrm>
     </dsp:sp>
     <dsp:sp modelId="{83F75F46-A7D6-D546-AEF0-D08F688BD658}">
@@ -3107,12 +3107,12 @@
         </a:fontRef>
       </dsp:style>
       <dsp:txBody>
-        <a:bodyPr spcFirstLastPara="0" vert="horz" wrap="square" lIns="205740" tIns="102870" rIns="205740" bIns="102870" numCol="1" spcCol="1270" anchor="ctr" anchorCtr="0">
+        <a:bodyPr spcFirstLastPara="0" vert="horz" wrap="square" lIns="217170" tIns="108585" rIns="217170" bIns="108585" numCol="1" spcCol="1270" anchor="ctr" anchorCtr="0">
           <a:noAutofit/>
         </a:bodyPr>
         <a:lstStyle/>
         <a:p>
-          <a:pPr lvl="0" algn="ctr" defTabSz="2400300">
+          <a:pPr lvl="0" algn="ctr" defTabSz="2533650">
             <a:lnSpc>
               <a:spcPct val="90000"/>
             </a:lnSpc>
@@ -3124,15 +3124,15 @@
             </a:spcAft>
           </a:pPr>
           <a:r>
-            <a:rPr lang="en-US" sz="5400" kern="1200" dirty="0" smtClean="0"/>
+            <a:rPr lang="en-US" sz="5700" kern="1200" dirty="0" smtClean="0"/>
             <a:t>Week 1</a:t>
           </a:r>
-          <a:endParaRPr lang="en-US" sz="5400" kern="1200" dirty="0"/>
+          <a:endParaRPr lang="en-US" sz="5700" kern="1200" dirty="0"/>
         </a:p>
       </dsp:txBody>
       <dsp:txXfrm>
-        <a:off x="52582" y="55045"/>
-        <a:ext cx="3184705" cy="971987"/>
+        <a:off x="0" y="2463"/>
+        <a:ext cx="3289869" cy="1077151"/>
       </dsp:txXfrm>
     </dsp:sp>
     <dsp:sp modelId="{45DAC81C-2BFA-1448-BCEC-653F0960A040}">
@@ -3229,9 +3229,9 @@
           <a:endParaRPr lang="en-US" sz="1800" kern="1200" dirty="0"/>
         </a:p>
       </dsp:txBody>
-      <dsp:txXfrm rot="-5400000">
-        <a:off x="3289870" y="1283253"/>
-        <a:ext cx="5806590" cy="777589"/>
+      <dsp:txXfrm rot="5400000">
+        <a:off x="5783337" y="-1252280"/>
+        <a:ext cx="861721" cy="5848656"/>
       </dsp:txXfrm>
     </dsp:sp>
     <dsp:sp modelId="{AB7F75BA-AB4C-8545-BF37-F3A2D50D5659}">
@@ -3297,12 +3297,12 @@
         </a:fontRef>
       </dsp:style>
       <dsp:txBody>
-        <a:bodyPr spcFirstLastPara="0" vert="horz" wrap="square" lIns="205740" tIns="102870" rIns="205740" bIns="102870" numCol="1" spcCol="1270" anchor="ctr" anchorCtr="0">
+        <a:bodyPr spcFirstLastPara="0" vert="horz" wrap="square" lIns="217170" tIns="108585" rIns="217170" bIns="108585" numCol="1" spcCol="1270" anchor="ctr" anchorCtr="0">
           <a:noAutofit/>
         </a:bodyPr>
         <a:lstStyle/>
         <a:p>
-          <a:pPr lvl="0" algn="ctr" defTabSz="2400300">
+          <a:pPr lvl="0" algn="ctr" defTabSz="2533650">
             <a:lnSpc>
               <a:spcPct val="90000"/>
             </a:lnSpc>
@@ -3314,15 +3314,15 @@
             </a:spcAft>
           </a:pPr>
           <a:r>
-            <a:rPr lang="en-US" sz="5400" kern="1200" dirty="0" smtClean="0"/>
+            <a:rPr lang="en-US" sz="5700" kern="1200" dirty="0" smtClean="0"/>
             <a:t>Week 2</a:t>
           </a:r>
-          <a:endParaRPr lang="en-US" sz="5400" kern="1200" dirty="0"/>
+          <a:endParaRPr lang="en-US" sz="5700" kern="1200" dirty="0"/>
         </a:p>
       </dsp:txBody>
       <dsp:txXfrm>
-        <a:off x="52582" y="1186054"/>
-        <a:ext cx="3184705" cy="971987"/>
+        <a:off x="0" y="1133472"/>
+        <a:ext cx="3289869" cy="1077151"/>
       </dsp:txXfrm>
     </dsp:sp>
     <dsp:sp modelId="{5E8E41D1-FD20-9C4D-BD1B-7FFE495DA9D0}">
@@ -3400,9 +3400,9 @@
           <a:endParaRPr lang="en-US" sz="1800" kern="1200" dirty="0"/>
         </a:p>
       </dsp:txBody>
-      <dsp:txXfrm rot="-5400000">
-        <a:off x="3289870" y="2414262"/>
-        <a:ext cx="5806590" cy="777589"/>
+      <dsp:txXfrm rot="5400000">
+        <a:off x="5783337" y="-121271"/>
+        <a:ext cx="861721" cy="5848656"/>
       </dsp:txXfrm>
     </dsp:sp>
     <dsp:sp modelId="{B72F2B7C-110C-D54A-875D-B3260D323E27}">
@@ -3468,12 +3468,12 @@
         </a:fontRef>
       </dsp:style>
       <dsp:txBody>
-        <a:bodyPr spcFirstLastPara="0" vert="horz" wrap="square" lIns="205740" tIns="102870" rIns="205740" bIns="102870" numCol="1" spcCol="1270" anchor="ctr" anchorCtr="0">
+        <a:bodyPr spcFirstLastPara="0" vert="horz" wrap="square" lIns="217170" tIns="108585" rIns="217170" bIns="108585" numCol="1" spcCol="1270" anchor="ctr" anchorCtr="0">
           <a:noAutofit/>
         </a:bodyPr>
         <a:lstStyle/>
         <a:p>
-          <a:pPr lvl="0" algn="ctr" defTabSz="2400300">
+          <a:pPr lvl="0" algn="ctr" defTabSz="2533650">
             <a:lnSpc>
               <a:spcPct val="90000"/>
             </a:lnSpc>
@@ -3485,15 +3485,15 @@
             </a:spcAft>
           </a:pPr>
           <a:r>
-            <a:rPr lang="en-US" sz="5400" kern="1200" dirty="0" smtClean="0"/>
+            <a:rPr lang="en-US" sz="5700" kern="1200" dirty="0" smtClean="0"/>
             <a:t>Week 3</a:t>
           </a:r>
-          <a:endParaRPr lang="en-US" sz="5400" kern="1200" dirty="0"/>
+          <a:endParaRPr lang="en-US" sz="5700" kern="1200" dirty="0"/>
         </a:p>
       </dsp:txBody>
       <dsp:txXfrm>
-        <a:off x="52582" y="2317063"/>
-        <a:ext cx="3184705" cy="971987"/>
+        <a:off x="0" y="2264481"/>
+        <a:ext cx="3289869" cy="1077151"/>
       </dsp:txXfrm>
     </dsp:sp>
     <dsp:sp modelId="{A8155454-DD96-3D4A-A30E-D804C22A463A}">
@@ -3598,9 +3598,9 @@
           <a:endParaRPr lang="en-US" sz="1800" kern="1200" dirty="0"/>
         </a:p>
       </dsp:txBody>
-      <dsp:txXfrm rot="-5400000">
-        <a:off x="3289870" y="3545270"/>
-        <a:ext cx="5806590" cy="777589"/>
+      <dsp:txXfrm rot="5400000">
+        <a:off x="5783337" y="1009737"/>
+        <a:ext cx="861721" cy="5848656"/>
       </dsp:txXfrm>
     </dsp:sp>
     <dsp:sp modelId="{5E1B08EB-5485-0144-963B-5DF980D5D82E}">
@@ -3666,12 +3666,12 @@
         </a:fontRef>
       </dsp:style>
       <dsp:txBody>
-        <a:bodyPr spcFirstLastPara="0" vert="horz" wrap="square" lIns="205740" tIns="102870" rIns="205740" bIns="102870" numCol="1" spcCol="1270" anchor="ctr" anchorCtr="0">
+        <a:bodyPr spcFirstLastPara="0" vert="horz" wrap="square" lIns="217170" tIns="108585" rIns="217170" bIns="108585" numCol="1" spcCol="1270" anchor="ctr" anchorCtr="0">
           <a:noAutofit/>
         </a:bodyPr>
         <a:lstStyle/>
         <a:p>
-          <a:pPr lvl="0" algn="ctr" defTabSz="2400300">
+          <a:pPr lvl="0" algn="ctr" defTabSz="2533650">
             <a:lnSpc>
               <a:spcPct val="90000"/>
             </a:lnSpc>
@@ -3683,15 +3683,15 @@
             </a:spcAft>
           </a:pPr>
           <a:r>
-            <a:rPr lang="en-US" sz="5400" kern="1200" dirty="0" smtClean="0"/>
+            <a:rPr lang="en-US" sz="5700" kern="1200" dirty="0" smtClean="0"/>
             <a:t>Week 4</a:t>
           </a:r>
-          <a:endParaRPr lang="en-US" sz="5400" kern="1200" dirty="0"/>
+          <a:endParaRPr lang="en-US" sz="5700" kern="1200" dirty="0"/>
         </a:p>
       </dsp:txBody>
       <dsp:txXfrm>
-        <a:off x="52582" y="3448072"/>
-        <a:ext cx="3184705" cy="971987"/>
+        <a:off x="0" y="3395490"/>
+        <a:ext cx="3289869" cy="1077151"/>
       </dsp:txXfrm>
     </dsp:sp>
     <dsp:sp modelId="{BD278198-5D54-6E48-BE07-CCD6F3B407BE}">
@@ -3788,9 +3788,9 @@
           <a:endParaRPr lang="en-US" sz="1800" kern="1200" dirty="0"/>
         </a:p>
       </dsp:txBody>
-      <dsp:txXfrm rot="-5400000">
-        <a:off x="3289870" y="4676279"/>
-        <a:ext cx="5806590" cy="777589"/>
+      <dsp:txXfrm rot="5400000">
+        <a:off x="5783337" y="2140746"/>
+        <a:ext cx="861721" cy="5848656"/>
       </dsp:txXfrm>
     </dsp:sp>
     <dsp:sp modelId="{3373B627-B53C-8C49-A234-488EBE331344}">
@@ -3856,12 +3856,12 @@
         </a:fontRef>
       </dsp:style>
       <dsp:txBody>
-        <a:bodyPr spcFirstLastPara="0" vert="horz" wrap="square" lIns="205740" tIns="102870" rIns="205740" bIns="102870" numCol="1" spcCol="1270" anchor="ctr" anchorCtr="0">
+        <a:bodyPr spcFirstLastPara="0" vert="horz" wrap="square" lIns="217170" tIns="108585" rIns="217170" bIns="108585" numCol="1" spcCol="1270" anchor="ctr" anchorCtr="0">
           <a:noAutofit/>
         </a:bodyPr>
         <a:lstStyle/>
         <a:p>
-          <a:pPr lvl="0" algn="ctr" defTabSz="2400300">
+          <a:pPr lvl="0" algn="ctr" defTabSz="2533650">
             <a:lnSpc>
               <a:spcPct val="90000"/>
             </a:lnSpc>
@@ -3873,15 +3873,15 @@
             </a:spcAft>
           </a:pPr>
           <a:r>
-            <a:rPr lang="en-US" sz="5400" kern="1200" dirty="0" smtClean="0"/>
+            <a:rPr lang="en-US" sz="5700" kern="1200" dirty="0" smtClean="0"/>
             <a:t>Week 5</a:t>
           </a:r>
-          <a:endParaRPr lang="en-US" sz="5400" kern="1200" dirty="0"/>
+          <a:endParaRPr lang="en-US" sz="5700" kern="1200" dirty="0"/>
         </a:p>
       </dsp:txBody>
       <dsp:txXfrm>
-        <a:off x="52582" y="4579081"/>
-        <a:ext cx="3184705" cy="971987"/>
+        <a:off x="0" y="4526499"/>
+        <a:ext cx="3289869" cy="1077151"/>
       </dsp:txXfrm>
     </dsp:sp>
   </dsp:spTree>
@@ -6568,7 +6568,7 @@
             <a:fld id="{AD18338A-78F5-014E-A190-F6EF036E0561}" type="datetimeFigureOut">
               <a:rPr lang="en-US" smtClean="0"/>
               <a:pPr/>
-              <a:t>5/28/14</a:t>
+              <a:t>5/28/2014</a:t>
             </a:fld>
             <a:endParaRPr lang="en-US"/>
           </a:p>
@@ -6882,7 +6882,7 @@
             <a:fld id="{AD18338A-78F5-014E-A190-F6EF036E0561}" type="datetimeFigureOut">
               <a:rPr lang="en-US" smtClean="0"/>
               <a:pPr/>
-              <a:t>5/28/14</a:t>
+              <a:t>5/28/2014</a:t>
             </a:fld>
             <a:endParaRPr lang="en-US"/>
           </a:p>
@@ -7075,7 +7075,7 @@
             <a:fld id="{AD18338A-78F5-014E-A190-F6EF036E0561}" type="datetimeFigureOut">
               <a:rPr lang="en-US" smtClean="0"/>
               <a:pPr/>
-              <a:t>5/28/14</a:t>
+              <a:t>5/28/2014</a:t>
             </a:fld>
             <a:endParaRPr lang="en-US"/>
           </a:p>
@@ -7278,7 +7278,7 @@
             <a:fld id="{AD18338A-78F5-014E-A190-F6EF036E0561}" type="datetimeFigureOut">
               <a:rPr lang="en-US" smtClean="0"/>
               <a:pPr/>
-              <a:t>5/28/14</a:t>
+              <a:t>5/28/2014</a:t>
             </a:fld>
             <a:endParaRPr lang="en-US"/>
           </a:p>
@@ -7471,7 +7471,7 @@
             <a:fld id="{AD18338A-78F5-014E-A190-F6EF036E0561}" type="datetimeFigureOut">
               <a:rPr lang="en-US" smtClean="0"/>
               <a:pPr/>
-              <a:t>5/28/14</a:t>
+              <a:t>5/28/2014</a:t>
             </a:fld>
             <a:endParaRPr lang="en-US"/>
           </a:p>
@@ -7743,7 +7743,7 @@
             <a:fld id="{AD18338A-78F5-014E-A190-F6EF036E0561}" type="datetimeFigureOut">
               <a:rPr lang="en-US" smtClean="0"/>
               <a:pPr/>
-              <a:t>5/28/14</a:t>
+              <a:t>5/28/2014</a:t>
             </a:fld>
             <a:endParaRPr lang="en-US"/>
           </a:p>
@@ -8056,7 +8056,7 @@
             <a:fld id="{AD18338A-78F5-014E-A190-F6EF036E0561}" type="datetimeFigureOut">
               <a:rPr lang="en-US" smtClean="0"/>
               <a:pPr/>
-              <a:t>5/28/14</a:t>
+              <a:t>5/28/2014</a:t>
             </a:fld>
             <a:endParaRPr lang="en-US"/>
           </a:p>
@@ -8519,7 +8519,7 @@
             <a:fld id="{AD18338A-78F5-014E-A190-F6EF036E0561}" type="datetimeFigureOut">
               <a:rPr lang="en-US" smtClean="0"/>
               <a:pPr/>
-              <a:t>5/28/14</a:t>
+              <a:t>5/28/2014</a:t>
             </a:fld>
             <a:endParaRPr lang="en-US"/>
           </a:p>
@@ -8660,7 +8660,7 @@
             <a:fld id="{AD18338A-78F5-014E-A190-F6EF036E0561}" type="datetimeFigureOut">
               <a:rPr lang="en-US" smtClean="0"/>
               <a:pPr/>
-              <a:t>5/28/14</a:t>
+              <a:t>5/28/2014</a:t>
             </a:fld>
             <a:endParaRPr lang="en-US"/>
           </a:p>
@@ -8778,7 +8778,7 @@
             <a:fld id="{AD18338A-78F5-014E-A190-F6EF036E0561}" type="datetimeFigureOut">
               <a:rPr lang="en-US" smtClean="0"/>
               <a:pPr/>
-              <a:t>5/28/14</a:t>
+              <a:t>5/28/2014</a:t>
             </a:fld>
             <a:endParaRPr lang="en-US"/>
           </a:p>
@@ -9059,7 +9059,7 @@
             <a:fld id="{AD18338A-78F5-014E-A190-F6EF036E0561}" type="datetimeFigureOut">
               <a:rPr lang="en-US" smtClean="0"/>
               <a:pPr/>
-              <a:t>5/28/14</a:t>
+              <a:t>5/28/2014</a:t>
             </a:fld>
             <a:endParaRPr lang="en-US"/>
           </a:p>
@@ -9396,7 +9396,7 @@
             <a:fld id="{AD18338A-78F5-014E-A190-F6EF036E0561}" type="datetimeFigureOut">
               <a:rPr lang="en-US" smtClean="0"/>
               <a:pPr/>
-              <a:t>5/28/14</a:t>
+              <a:t>5/28/2014</a:t>
             </a:fld>
             <a:endParaRPr lang="en-US"/>
           </a:p>
@@ -9675,7 +9675,7 @@
             <a:fld id="{AD18338A-78F5-014E-A190-F6EF036E0561}" type="datetimeFigureOut">
               <a:rPr lang="en-US" smtClean="0"/>
               <a:pPr/>
-              <a:t>5/28/14</a:t>
+              <a:t>5/28/2014</a:t>
             </a:fld>
             <a:endParaRPr lang="en-US"/>
           </a:p>
@@ -10596,15 +10596,7 @@
           <a:p>
             <a:r>
               <a:rPr lang="en-US" dirty="0" smtClean="0"/>
-              <a:t>Networking is the practice of linking </a:t>
-            </a:r>
-            <a:r>
-              <a:rPr lang="en-US" dirty="0" smtClean="0"/>
-              <a:t>two </a:t>
-            </a:r>
-            <a:r>
-              <a:rPr lang="en-US" dirty="0" smtClean="0"/>
-              <a:t>or more computing devices with the purpose of sharing data.</a:t>
+              <a:t>Networking is the practice of linking two or more computing devices with the purpose of sharing data.</a:t>
             </a:r>
           </a:p>
           <a:p>
@@ -10696,61 +10688,20 @@
           <a:p>
             <a:r>
               <a:rPr lang="en-US" dirty="0" smtClean="0"/>
-              <a:t>We tried to create a main Game Server, which would </a:t>
-            </a:r>
+              <a:t>We tried to create a main Game Server, which would either connect a Human Player client and an Artificial Intelligence client, or two Human Players. </a:t>
+            </a:r>
+            <a:endParaRPr lang="en-US" dirty="0"/>
+          </a:p>
+          <a:p>
             <a:r>
               <a:rPr lang="en-US" dirty="0" smtClean="0"/>
-              <a:t>either </a:t>
-            </a:r>
+              <a:t>Each Artificial Intelligence Client connected to the main Game Server, which started a game session with the human client</a:t>
+            </a:r>
+          </a:p>
+          <a:p>
             <a:r>
               <a:rPr lang="en-US" dirty="0" smtClean="0"/>
-              <a:t>connect a Human Player client and an Artificial Intelligence client, or </a:t>
-            </a:r>
-            <a:r>
-              <a:rPr lang="en-US" dirty="0" smtClean="0"/>
-              <a:t>two </a:t>
-            </a:r>
-            <a:r>
-              <a:rPr lang="en-US" dirty="0" smtClean="0"/>
-              <a:t>Human Players. </a:t>
-            </a:r>
-            <a:endParaRPr lang="en-US" dirty="0"/>
-          </a:p>
-          <a:p>
-            <a:r>
-              <a:rPr lang="en-US" dirty="0" smtClean="0"/>
-              <a:t>Each Artificial Intelligence Client </a:t>
-            </a:r>
-            <a:r>
-              <a:rPr lang="en-US" dirty="0" smtClean="0"/>
-              <a:t>connected</a:t>
-            </a:r>
-            <a:r>
-              <a:rPr lang="en-US" dirty="0" smtClean="0"/>
-              <a:t> to </a:t>
-            </a:r>
-            <a:r>
-              <a:rPr lang="en-US" dirty="0" smtClean="0"/>
-              <a:t>the main Game </a:t>
-            </a:r>
-            <a:r>
-              <a:rPr lang="en-US" dirty="0" smtClean="0"/>
-              <a:t>Server, which started a game session with the human client</a:t>
-            </a:r>
-            <a:endParaRPr lang="en-US" dirty="0" smtClean="0"/>
-          </a:p>
-          <a:p>
-            <a:r>
-              <a:rPr lang="en-US" dirty="0" smtClean="0"/>
-              <a:t>For human to human, we tried to connect two human players to the main game server, and we were actually successful, but there were </a:t>
-            </a:r>
-            <a:r>
-              <a:rPr lang="en-US" dirty="0" smtClean="0"/>
-              <a:t>problems </a:t>
-            </a:r>
-            <a:r>
-              <a:rPr lang="en-US" dirty="0" smtClean="0"/>
-              <a:t>in the communication of the different moves</a:t>
+              <a:t>For human to human, we tried to connect two human players to the main game server, and we were actually successful, but there were problems in the communication of the different moves</a:t>
             </a:r>
           </a:p>
           <a:p>
@@ -10828,7 +10779,7 @@
           <a:blip r:embed="rId2">
             <a:extLst>
               <a:ext uri="{28A0092B-C50C-407E-A947-70E740481C1C}">
-                <a14:useLocalDpi xmlns:a14="http://schemas.microsoft.com/office/drawing/2010/main" val="0"/>
+                <a14:useLocalDpi xmlns:a14="http://schemas.microsoft.com/office/drawing/2010/main" xmlns="" val="0"/>
               </a:ext>
             </a:extLst>
           </a:blip>
@@ -10945,7 +10896,7 @@
           <a:blip r:embed="rId2">
             <a:extLst>
               <a:ext uri="{28A0092B-C50C-407E-A947-70E740481C1C}">
-                <a14:useLocalDpi xmlns:a14="http://schemas.microsoft.com/office/drawing/2010/main" val="0"/>
+                <a14:useLocalDpi xmlns:a14="http://schemas.microsoft.com/office/drawing/2010/main" xmlns="" val="0"/>
               </a:ext>
             </a:extLst>
           </a:blip>
@@ -11038,7 +10989,7 @@
     </p:spTree>
     <p:extLst>
       <p:ext uri="{BB962C8B-B14F-4D97-AF65-F5344CB8AC3E}">
-        <p14:creationId xmlns:p14="http://schemas.microsoft.com/office/powerpoint/2010/main" val="1370102371"/>
+        <p14:creationId xmlns:p14="http://schemas.microsoft.com/office/powerpoint/2010/main" xmlns="" val="1370102371"/>
       </p:ext>
     </p:extLst>
   </p:cSld>
@@ -11048,7 +10999,7 @@
   <p:timing>
     <p:tnLst>
       <p:par>
-        <p:cTn xmlns:p14="http://schemas.microsoft.com/office/powerpoint/2010/main" id="1" dur="indefinite" restart="never" nodeType="tmRoot"/>
+        <p:cTn id="1" dur="indefinite" restart="never" nodeType="tmRoot"/>
       </p:par>
     </p:tnLst>
   </p:timing>
@@ -11111,7 +11062,7 @@
           <a:blip r:embed="rId2">
             <a:extLst>
               <a:ext uri="{28A0092B-C50C-407E-A947-70E740481C1C}">
-                <a14:useLocalDpi xmlns:a14="http://schemas.microsoft.com/office/drawing/2010/main" val="0"/>
+                <a14:useLocalDpi xmlns:a14="http://schemas.microsoft.com/office/drawing/2010/main" xmlns="" val="0"/>
               </a:ext>
             </a:extLst>
           </a:blip>
@@ -11141,7 +11092,7 @@
           <a:blip r:embed="rId3">
             <a:extLst>
               <a:ext uri="{28A0092B-C50C-407E-A947-70E740481C1C}">
-                <a14:useLocalDpi xmlns:a14="http://schemas.microsoft.com/office/drawing/2010/main" val="0"/>
+                <a14:useLocalDpi xmlns:a14="http://schemas.microsoft.com/office/drawing/2010/main" xmlns="" val="0"/>
               </a:ext>
             </a:extLst>
           </a:blip>
@@ -11162,7 +11113,7 @@
     </p:spTree>
     <p:extLst>
       <p:ext uri="{BB962C8B-B14F-4D97-AF65-F5344CB8AC3E}">
-        <p14:creationId xmlns:p14="http://schemas.microsoft.com/office/powerpoint/2010/main" val="1757275341"/>
+        <p14:creationId xmlns:p14="http://schemas.microsoft.com/office/powerpoint/2010/main" xmlns="" val="1757275341"/>
       </p:ext>
     </p:extLst>
   </p:cSld>
@@ -11172,7 +11123,7 @@
   <p:timing>
     <p:tnLst>
       <p:par>
-        <p:cTn xmlns:p14="http://schemas.microsoft.com/office/powerpoint/2010/main" id="1" dur="indefinite" restart="never" nodeType="tmRoot"/>
+        <p:cTn id="1" dur="indefinite" restart="never" nodeType="tmRoot"/>
       </p:par>
     </p:tnLst>
   </p:timing>
@@ -11384,7 +11335,7 @@
             <p:ph idx="1"/>
             <p:extLst>
               <p:ext uri="{D42A27DB-BD31-4B8C-83A1-F6EECF244321}">
-                <p14:modId xmlns:p14="http://schemas.microsoft.com/office/powerpoint/2010/main" val="2002672239"/>
+                <p14:modId xmlns:p14="http://schemas.microsoft.com/office/powerpoint/2010/main" xmlns="" val="2002672239"/>
               </p:ext>
             </p:extLst>
           </p:nvPr>
@@ -11407,7 +11358,7 @@
   <p:timing>
     <p:tnLst>
       <p:par>
-        <p:cTn xmlns:p14="http://schemas.microsoft.com/office/powerpoint/2010/main" id="1" dur="indefinite" restart="never" nodeType="tmRoot"/>
+        <p:cTn id="1" dur="indefinite" restart="never" nodeType="tmRoot"/>
       </p:par>
     </p:tnLst>
   </p:timing>
@@ -11471,11 +11422,7 @@
           <a:p>
             <a:r>
               <a:rPr lang="en-US" dirty="0" smtClean="0"/>
-              <a:t>Eclipse </a:t>
-            </a:r>
-            <a:r>
-              <a:rPr lang="en-US" dirty="0" smtClean="0"/>
-              <a:t>Java Development Toolkit Installed</a:t>
+              <a:t>Eclipse Java Development Toolkit Installed</a:t>
             </a:r>
           </a:p>
           <a:p>
@@ -11507,7 +11454,7 @@
   <p:timing>
     <p:tnLst>
       <p:par>
-        <p:cTn xmlns:p14="http://schemas.microsoft.com/office/powerpoint/2010/main" id="1" dur="indefinite" restart="never" nodeType="tmRoot"/>
+        <p:cTn id="1" dur="indefinite" restart="never" nodeType="tmRoot"/>
       </p:par>
     </p:tnLst>
   </p:timing>
@@ -11835,11 +11782,7 @@
           <a:p>
             <a:r>
               <a:rPr lang="en-US" dirty="0" smtClean="0"/>
-              <a:t>Can Play With Friends Online Using Networked Connect </a:t>
-            </a:r>
-            <a:r>
-              <a:rPr lang="en-US" dirty="0" smtClean="0"/>
-              <a:t>Four (failed)</a:t>
+              <a:t>Can Play With Friends Online Using Networked Connect Four (failed)</a:t>
             </a:r>
             <a:endParaRPr lang="en-US" dirty="0"/>
           </a:p>
@@ -12168,28 +12111,6 @@
                     <a:p>
                       <a:r>
                         <a:rPr lang="en-US" dirty="0" smtClean="0"/>
-                        <a:t>    -</a:t>
-                      </a:r>
-                      <a:r>
-                        <a:rPr lang="en-US" dirty="0" err="1" smtClean="0"/>
-                        <a:t>Connect</a:t>
-                      </a:r>
-                      <a:r>
-                        <a:rPr lang="en-US" baseline="0" dirty="0" err="1" smtClean="0"/>
-                        <a:t>W</a:t>
-                      </a:r>
-                      <a:r>
-                        <a:rPr lang="en-US" dirty="0" err="1" smtClean="0"/>
-                        <a:t>orld</a:t>
-                      </a:r>
-                      <a:endParaRPr lang="en-US" dirty="0" smtClean="0"/>
-                    </a:p>
-                    <a:p>
-                      <a:endParaRPr lang="en-US" dirty="0" smtClean="0"/>
-                    </a:p>
-                    <a:p>
-                      <a:r>
-                        <a:rPr lang="en-US" dirty="0" smtClean="0"/>
                         <a:t>-Documentation</a:t>
                       </a:r>
                     </a:p>
@@ -12258,6 +12179,14 @@
                       </a:r>
                     </a:p>
                     <a:p>
+                      <a:r>
+                        <a:rPr lang="en-US" dirty="0" smtClean="0"/>
+                        <a:t>-</a:t>
+                      </a:r>
+                      <a:r>
+                        <a:rPr lang="en-US" smtClean="0"/>
+                        <a:t>ConnectWorld</a:t>
+                      </a:r>
                       <a:endParaRPr lang="en-US" dirty="0" smtClean="0"/>
                     </a:p>
                     <a:p>

</xml_diff>